<commit_message>
4-23 cover only when call and put price sum <c
</commit_message>
<xml_diff>
--- a/選擇權自動化.pptx
+++ b/選擇權自動化.pptx
@@ -273,7 +273,7 @@
           <a:p>
             <a:fld id="{F08863E2-33C6-4A67-A414-40E7C2332897}" type="datetimeFigureOut">
               <a:rPr lang="zh-TW" altLang="en-US" smtClean="0"/>
-              <a:t>2023/3/8</a:t>
+              <a:t>2024/4/14</a:t>
             </a:fld>
             <a:endParaRPr lang="zh-TW" altLang="en-US"/>
           </a:p>
@@ -471,7 +471,7 @@
           <a:p>
             <a:fld id="{F08863E2-33C6-4A67-A414-40E7C2332897}" type="datetimeFigureOut">
               <a:rPr lang="zh-TW" altLang="en-US" smtClean="0"/>
-              <a:t>2023/3/8</a:t>
+              <a:t>2024/4/14</a:t>
             </a:fld>
             <a:endParaRPr lang="zh-TW" altLang="en-US"/>
           </a:p>
@@ -679,7 +679,7 @@
           <a:p>
             <a:fld id="{F08863E2-33C6-4A67-A414-40E7C2332897}" type="datetimeFigureOut">
               <a:rPr lang="zh-TW" altLang="en-US" smtClean="0"/>
-              <a:t>2023/3/8</a:t>
+              <a:t>2024/4/14</a:t>
             </a:fld>
             <a:endParaRPr lang="zh-TW" altLang="en-US"/>
           </a:p>
@@ -877,7 +877,7 @@
           <a:p>
             <a:fld id="{F08863E2-33C6-4A67-A414-40E7C2332897}" type="datetimeFigureOut">
               <a:rPr lang="zh-TW" altLang="en-US" smtClean="0"/>
-              <a:t>2023/3/8</a:t>
+              <a:t>2024/4/14</a:t>
             </a:fld>
             <a:endParaRPr lang="zh-TW" altLang="en-US"/>
           </a:p>
@@ -1152,7 +1152,7 @@
           <a:p>
             <a:fld id="{F08863E2-33C6-4A67-A414-40E7C2332897}" type="datetimeFigureOut">
               <a:rPr lang="zh-TW" altLang="en-US" smtClean="0"/>
-              <a:t>2023/3/8</a:t>
+              <a:t>2024/4/14</a:t>
             </a:fld>
             <a:endParaRPr lang="zh-TW" altLang="en-US"/>
           </a:p>
@@ -1417,7 +1417,7 @@
           <a:p>
             <a:fld id="{F08863E2-33C6-4A67-A414-40E7C2332897}" type="datetimeFigureOut">
               <a:rPr lang="zh-TW" altLang="en-US" smtClean="0"/>
-              <a:t>2023/3/8</a:t>
+              <a:t>2024/4/14</a:t>
             </a:fld>
             <a:endParaRPr lang="zh-TW" altLang="en-US"/>
           </a:p>
@@ -1829,7 +1829,7 @@
           <a:p>
             <a:fld id="{F08863E2-33C6-4A67-A414-40E7C2332897}" type="datetimeFigureOut">
               <a:rPr lang="zh-TW" altLang="en-US" smtClean="0"/>
-              <a:t>2023/3/8</a:t>
+              <a:t>2024/4/14</a:t>
             </a:fld>
             <a:endParaRPr lang="zh-TW" altLang="en-US"/>
           </a:p>
@@ -1970,7 +1970,7 @@
           <a:p>
             <a:fld id="{F08863E2-33C6-4A67-A414-40E7C2332897}" type="datetimeFigureOut">
               <a:rPr lang="zh-TW" altLang="en-US" smtClean="0"/>
-              <a:t>2023/3/8</a:t>
+              <a:t>2024/4/14</a:t>
             </a:fld>
             <a:endParaRPr lang="zh-TW" altLang="en-US"/>
           </a:p>
@@ -2083,7 +2083,7 @@
           <a:p>
             <a:fld id="{F08863E2-33C6-4A67-A414-40E7C2332897}" type="datetimeFigureOut">
               <a:rPr lang="zh-TW" altLang="en-US" smtClean="0"/>
-              <a:t>2023/3/8</a:t>
+              <a:t>2024/4/14</a:t>
             </a:fld>
             <a:endParaRPr lang="zh-TW" altLang="en-US"/>
           </a:p>
@@ -2394,7 +2394,7 @@
           <a:p>
             <a:fld id="{F08863E2-33C6-4A67-A414-40E7C2332897}" type="datetimeFigureOut">
               <a:rPr lang="zh-TW" altLang="en-US" smtClean="0"/>
-              <a:t>2023/3/8</a:t>
+              <a:t>2024/4/14</a:t>
             </a:fld>
             <a:endParaRPr lang="zh-TW" altLang="en-US"/>
           </a:p>
@@ -2682,7 +2682,7 @@
           <a:p>
             <a:fld id="{F08863E2-33C6-4A67-A414-40E7C2332897}" type="datetimeFigureOut">
               <a:rPr lang="zh-TW" altLang="en-US" smtClean="0"/>
-              <a:t>2023/3/8</a:t>
+              <a:t>2024/4/14</a:t>
             </a:fld>
             <a:endParaRPr lang="zh-TW" altLang="en-US"/>
           </a:p>
@@ -2923,7 +2923,7 @@
           <a:p>
             <a:fld id="{F08863E2-33C6-4A67-A414-40E7C2332897}" type="datetimeFigureOut">
               <a:rPr lang="zh-TW" altLang="en-US" smtClean="0"/>
-              <a:t>2023/3/8</a:t>
+              <a:t>2024/4/14</a:t>
             </a:fld>
             <a:endParaRPr lang="zh-TW" altLang="en-US"/>
           </a:p>
@@ -3449,7 +3449,7 @@
           <a:p>
             <a:r>
               <a:rPr lang="zh-TW" altLang="en-US" dirty="0"/>
-              <a:t>憑倉買進價格是動態調整</a:t>
+              <a:t>平倉買進價格是動態調整</a:t>
             </a:r>
             <a:r>
               <a:rPr lang="en-US" altLang="zh-TW" dirty="0"/>

</xml_diff>